<commit_message>
Command prompt additions (#11)
* Various Modifications

Added more commands, and modified some of the other commands

* More commands added

view - Works with images, eventually support for videos will be added, albeit with no audio.
Github - opens an instance of GitHubDesktop
DF - opens an instance of Dwarf Fortress.V50
</commit_message>
<xml_diff>
--- a/Fallout 4 Terminal Emulator.pptx
+++ b/Fallout 4 Terminal Emulator.pptx
@@ -105,6 +105,11 @@
       </a:defRPr>
     </a:lvl9pPr>
   </p:defaultTextStyle>
+  <p:extLst>
+    <p:ext uri="{EFAFB233-063F-42B5-8137-9DF3F51BA10A}">
+      <p15:sldGuideLst xmlns:p15="http://schemas.microsoft.com/office/powerpoint/2012/main"/>
+    </p:ext>
+  </p:extLst>
 </p:presentation>
 </file>
 
@@ -239,7 +244,7 @@
           <a:p>
             <a:fld id="{BABC3601-4041-4787-99DD-1190F32A474F}" type="datetimeFigureOut">
               <a:rPr lang="en-US" smtClean="0"/>
-              <a:t>4/12/2023</a:t>
+              <a:t>4/30/2023</a:t>
             </a:fld>
             <a:endParaRPr lang="en-US"/>
           </a:p>
@@ -409,7 +414,7 @@
           <a:p>
             <a:fld id="{BABC3601-4041-4787-99DD-1190F32A474F}" type="datetimeFigureOut">
               <a:rPr lang="en-US" smtClean="0"/>
-              <a:t>4/12/2023</a:t>
+              <a:t>4/30/2023</a:t>
             </a:fld>
             <a:endParaRPr lang="en-US"/>
           </a:p>
@@ -589,7 +594,7 @@
           <a:p>
             <a:fld id="{BABC3601-4041-4787-99DD-1190F32A474F}" type="datetimeFigureOut">
               <a:rPr lang="en-US" smtClean="0"/>
-              <a:t>4/12/2023</a:t>
+              <a:t>4/30/2023</a:t>
             </a:fld>
             <a:endParaRPr lang="en-US"/>
           </a:p>
@@ -759,7 +764,7 @@
           <a:p>
             <a:fld id="{BABC3601-4041-4787-99DD-1190F32A474F}" type="datetimeFigureOut">
               <a:rPr lang="en-US" smtClean="0"/>
-              <a:t>4/12/2023</a:t>
+              <a:t>4/30/2023</a:t>
             </a:fld>
             <a:endParaRPr lang="en-US"/>
           </a:p>
@@ -1005,7 +1010,7 @@
           <a:p>
             <a:fld id="{BABC3601-4041-4787-99DD-1190F32A474F}" type="datetimeFigureOut">
               <a:rPr lang="en-US" smtClean="0"/>
-              <a:t>4/12/2023</a:t>
+              <a:t>4/30/2023</a:t>
             </a:fld>
             <a:endParaRPr lang="en-US"/>
           </a:p>
@@ -1237,7 +1242,7 @@
           <a:p>
             <a:fld id="{BABC3601-4041-4787-99DD-1190F32A474F}" type="datetimeFigureOut">
               <a:rPr lang="en-US" smtClean="0"/>
-              <a:t>4/12/2023</a:t>
+              <a:t>4/30/2023</a:t>
             </a:fld>
             <a:endParaRPr lang="en-US"/>
           </a:p>
@@ -1604,7 +1609,7 @@
           <a:p>
             <a:fld id="{BABC3601-4041-4787-99DD-1190F32A474F}" type="datetimeFigureOut">
               <a:rPr lang="en-US" smtClean="0"/>
-              <a:t>4/12/2023</a:t>
+              <a:t>4/30/2023</a:t>
             </a:fld>
             <a:endParaRPr lang="en-US"/>
           </a:p>
@@ -1722,7 +1727,7 @@
           <a:p>
             <a:fld id="{BABC3601-4041-4787-99DD-1190F32A474F}" type="datetimeFigureOut">
               <a:rPr lang="en-US" smtClean="0"/>
-              <a:t>4/12/2023</a:t>
+              <a:t>4/30/2023</a:t>
             </a:fld>
             <a:endParaRPr lang="en-US"/>
           </a:p>
@@ -1817,7 +1822,7 @@
           <a:p>
             <a:fld id="{BABC3601-4041-4787-99DD-1190F32A474F}" type="datetimeFigureOut">
               <a:rPr lang="en-US" smtClean="0"/>
-              <a:t>4/12/2023</a:t>
+              <a:t>4/30/2023</a:t>
             </a:fld>
             <a:endParaRPr lang="en-US"/>
           </a:p>
@@ -2094,7 +2099,7 @@
           <a:p>
             <a:fld id="{BABC3601-4041-4787-99DD-1190F32A474F}" type="datetimeFigureOut">
               <a:rPr lang="en-US" smtClean="0"/>
-              <a:t>4/12/2023</a:t>
+              <a:t>4/30/2023</a:t>
             </a:fld>
             <a:endParaRPr lang="en-US"/>
           </a:p>
@@ -2351,7 +2356,7 @@
           <a:p>
             <a:fld id="{BABC3601-4041-4787-99DD-1190F32A474F}" type="datetimeFigureOut">
               <a:rPr lang="en-US" smtClean="0"/>
-              <a:t>4/12/2023</a:t>
+              <a:t>4/30/2023</a:t>
             </a:fld>
             <a:endParaRPr lang="en-US"/>
           </a:p>
@@ -2564,7 +2569,7 @@
           <a:p>
             <a:fld id="{BABC3601-4041-4787-99DD-1190F32A474F}" type="datetimeFigureOut">
               <a:rPr lang="en-US" smtClean="0"/>
-              <a:t>4/12/2023</a:t>
+              <a:t>4/30/2023</a:t>
             </a:fld>
             <a:endParaRPr lang="en-US"/>
           </a:p>
@@ -3131,25 +3136,41 @@
           </a:p>
           <a:p>
             <a:r>
-              <a:rPr lang="en-US" dirty="0"/>
+              <a:rPr lang="en-US" dirty="0">
+                <a:highlight>
+                  <a:srgbClr val="00FF00"/>
+                </a:highlight>
+              </a:rPr>
               <a:t>Configure a page to display to act as hacking the terminal in game</a:t>
             </a:r>
           </a:p>
           <a:p>
             <a:r>
-              <a:rPr lang="en-US" dirty="0"/>
+              <a:rPr lang="en-US" dirty="0">
+                <a:highlight>
+                  <a:srgbClr val="00FF00"/>
+                </a:highlight>
+              </a:rPr>
               <a:t>Add Terminal entries that have files connected to them.</a:t>
             </a:r>
           </a:p>
           <a:p>
             <a:r>
-              <a:rPr lang="en-US" dirty="0"/>
+              <a:rPr lang="en-US" dirty="0">
+                <a:highlight>
+                  <a:srgbClr val="00FF00"/>
+                </a:highlight>
+              </a:rPr>
               <a:t>Make a Create New File function</a:t>
             </a:r>
           </a:p>
           <a:p>
             <a:r>
-              <a:rPr lang="en-US" dirty="0"/>
+              <a:rPr lang="en-US" dirty="0">
+                <a:highlight>
+                  <a:srgbClr val="00FF00"/>
+                </a:highlight>
+              </a:rPr>
               <a:t>Make a Edit File function</a:t>
             </a:r>
           </a:p>

</xml_diff>